<commit_message>
Misprint on slide 2
</commit_message>
<xml_diff>
--- a/embeddedCpp25July/Presentation/DevBg_EmbbeddedC++.pptx
+++ b/embeddedCpp25July/Presentation/DevBg_EmbbeddedC++.pptx
@@ -6438,7 +6438,7 @@
         <p:spPr>
           <a:xfrm>
             <a:off x="685800" y="2130480"/>
-            <a:ext cx="7769880" cy="1467360"/>
+            <a:ext cx="7769520" cy="1467000"/>
           </a:xfrm>
           <a:prstGeom prst="rect">
             <a:avLst/>
@@ -6489,7 +6489,7 @@
         <p:spPr>
           <a:xfrm>
             <a:off x="4911120" y="5926680"/>
-            <a:ext cx="4205880" cy="911160"/>
+            <a:ext cx="4205520" cy="910800"/>
           </a:xfrm>
           <a:prstGeom prst="rect">
             <a:avLst/>
@@ -6556,7 +6556,7 @@
         <p:spPr>
           <a:xfrm>
             <a:off x="0" y="6492600"/>
-            <a:ext cx="5697720" cy="366480"/>
+            <a:ext cx="5697360" cy="366120"/>
           </a:xfrm>
           <a:prstGeom prst="rect">
             <a:avLst/>
@@ -6587,6 +6587,7 @@
                 </a:solidFill>
                 <a:uFillTx/>
                 <a:latin typeface="Arial"/>
+                <a:ea typeface="DejaVu Sans"/>
                 <a:hlinkClick r:id="rId1"/>
               </a:rPr>
               <a:t>https://github.com/PavelKanazirev/MyDev.Bg</a:t>
@@ -6655,7 +6656,7 @@
         <p:spPr>
           <a:xfrm>
             <a:off x="0" y="2880"/>
-            <a:ext cx="9141480" cy="1185120"/>
+            <a:ext cx="9141120" cy="1184760"/>
           </a:xfrm>
           <a:prstGeom prst="rect">
             <a:avLst/>
@@ -6726,7 +6727,7 @@
         <p:spPr>
           <a:xfrm>
             <a:off x="182880" y="1297800"/>
-            <a:ext cx="8782560" cy="3105720"/>
+            <a:ext cx="8782200" cy="3105360"/>
           </a:xfrm>
           <a:prstGeom prst="rect">
             <a:avLst/>
@@ -6954,7 +6955,7 @@
         <p:spPr>
           <a:xfrm>
             <a:off x="457200" y="274680"/>
-            <a:ext cx="8227080" cy="1140480"/>
+            <a:ext cx="8226720" cy="1140120"/>
           </a:xfrm>
           <a:prstGeom prst="rect">
             <a:avLst/>
@@ -7005,7 +7006,7 @@
         <p:spPr>
           <a:xfrm>
             <a:off x="457200" y="1600200"/>
-            <a:ext cx="8227080" cy="4523400"/>
+            <a:ext cx="8226720" cy="4523040"/>
           </a:xfrm>
           <a:prstGeom prst="rect">
             <a:avLst/>
@@ -7026,7 +7027,7 @@
             <a:normAutofit/>
           </a:bodyPr>
           <a:p>
-            <a:pPr marL="343080" indent="-340560">
+            <a:pPr marL="343080" indent="-340200">
               <a:lnSpc>
                 <a:spcPct val="100000"/>
               </a:lnSpc>
@@ -7054,7 +7055,7 @@
             </a:endParaRPr>
           </a:p>
           <a:p>
-            <a:pPr marL="343080" indent="-340560">
+            <a:pPr marL="343080" indent="-340200">
               <a:lnSpc>
                 <a:spcPct val="100000"/>
               </a:lnSpc>
@@ -7082,7 +7083,7 @@
             </a:endParaRPr>
           </a:p>
           <a:p>
-            <a:pPr marL="514440" indent="-511920">
+            <a:pPr marL="514440" indent="-511560">
               <a:lnSpc>
                 <a:spcPct val="100000"/>
               </a:lnSpc>
@@ -7110,7 +7111,7 @@
             </a:endParaRPr>
           </a:p>
           <a:p>
-            <a:pPr marL="514440" indent="-511920">
+            <a:pPr marL="514440" indent="-511560">
               <a:lnSpc>
                 <a:spcPct val="100000"/>
               </a:lnSpc>
@@ -7210,7 +7211,7 @@
         <p:spPr>
           <a:xfrm>
             <a:off x="457200" y="274680"/>
-            <a:ext cx="8227080" cy="1140480"/>
+            <a:ext cx="8226720" cy="1140120"/>
           </a:xfrm>
           <a:prstGeom prst="rect">
             <a:avLst/>
@@ -7261,7 +7262,7 @@
         <p:spPr>
           <a:xfrm>
             <a:off x="457200" y="1600200"/>
-            <a:ext cx="8227080" cy="4523400"/>
+            <a:ext cx="8226720" cy="4523040"/>
           </a:xfrm>
           <a:prstGeom prst="rect">
             <a:avLst/>
@@ -7282,7 +7283,7 @@
             <a:normAutofit/>
           </a:bodyPr>
           <a:p>
-            <a:pPr marL="343080" indent="-340560">
+            <a:pPr marL="343080" indent="-340200">
               <a:lnSpc>
                 <a:spcPct val="100000"/>
               </a:lnSpc>
@@ -7369,7 +7370,7 @@
         <p:spPr>
           <a:xfrm>
             <a:off x="457200" y="274680"/>
-            <a:ext cx="8227080" cy="1140480"/>
+            <a:ext cx="8226720" cy="1140120"/>
           </a:xfrm>
           <a:prstGeom prst="rect">
             <a:avLst/>
@@ -7424,7 +7425,7 @@
         <p:spPr>
           <a:xfrm>
             <a:off x="971640" y="2565000"/>
-            <a:ext cx="7054200" cy="3888720"/>
+            <a:ext cx="7053840" cy="3888360"/>
           </a:xfrm>
           <a:prstGeom prst="rect">
             <a:avLst/>
@@ -7443,7 +7444,7 @@
         <p:spPr>
           <a:xfrm>
             <a:off x="467640" y="1340640"/>
-            <a:ext cx="8278560" cy="1221480"/>
+            <a:ext cx="8278200" cy="1221120"/>
           </a:xfrm>
           <a:prstGeom prst="rect">
             <a:avLst/>
@@ -7464,7 +7465,7 @@
             <a:normAutofit/>
           </a:bodyPr>
           <a:p>
-            <a:pPr marL="343080" indent="-340560">
+            <a:pPr marL="343080" indent="-340200">
               <a:lnSpc>
                 <a:spcPct val="100000"/>
               </a:lnSpc>
@@ -7551,7 +7552,7 @@
         <p:spPr>
           <a:xfrm>
             <a:off x="457200" y="274680"/>
-            <a:ext cx="8227080" cy="1140480"/>
+            <a:ext cx="8226720" cy="1140120"/>
           </a:xfrm>
           <a:prstGeom prst="rect">
             <a:avLst/>
@@ -7602,7 +7603,7 @@
         <p:spPr>
           <a:xfrm>
             <a:off x="385200" y="1412640"/>
-            <a:ext cx="8227080" cy="1178280"/>
+            <a:ext cx="8226720" cy="1177920"/>
           </a:xfrm>
           <a:prstGeom prst="rect">
             <a:avLst/>
@@ -7623,7 +7624,7 @@
             <a:normAutofit/>
           </a:bodyPr>
           <a:p>
-            <a:pPr marL="343080" indent="-340560">
+            <a:pPr marL="343080" indent="-340200">
               <a:lnSpc>
                 <a:spcPct val="100000"/>
               </a:lnSpc>
@@ -7678,7 +7679,7 @@
         <p:spPr>
           <a:xfrm>
             <a:off x="1403640" y="2608920"/>
-            <a:ext cx="6612840" cy="3710520"/>
+            <a:ext cx="6612480" cy="3710160"/>
           </a:xfrm>
           <a:prstGeom prst="rect">
             <a:avLst/>
@@ -7746,7 +7747,7 @@
         <p:spPr>
           <a:xfrm>
             <a:off x="457200" y="274680"/>
-            <a:ext cx="8227080" cy="1140480"/>
+            <a:ext cx="8226720" cy="1140120"/>
           </a:xfrm>
           <a:prstGeom prst="rect">
             <a:avLst/>
@@ -7797,7 +7798,7 @@
         <p:spPr>
           <a:xfrm>
             <a:off x="457200" y="1600200"/>
-            <a:ext cx="8227080" cy="4523400"/>
+            <a:ext cx="8226720" cy="4523040"/>
           </a:xfrm>
           <a:prstGeom prst="rect">
             <a:avLst/>
@@ -7995,7 +7996,7 @@
         <p:spPr>
           <a:xfrm>
             <a:off x="457200" y="274680"/>
-            <a:ext cx="8227080" cy="1140480"/>
+            <a:ext cx="8226720" cy="1140120"/>
           </a:xfrm>
           <a:prstGeom prst="rect">
             <a:avLst/>
@@ -8050,7 +8051,7 @@
         <p:spPr>
           <a:xfrm>
             <a:off x="182880" y="1351800"/>
-            <a:ext cx="8654400" cy="4864680"/>
+            <a:ext cx="8654040" cy="4864320"/>
           </a:xfrm>
           <a:prstGeom prst="rect">
             <a:avLst/>
@@ -8069,7 +8070,7 @@
         <p:spPr>
           <a:xfrm>
             <a:off x="91440" y="6491160"/>
-            <a:ext cx="8320680" cy="366480"/>
+            <a:ext cx="8320320" cy="366120"/>
           </a:xfrm>
           <a:prstGeom prst="rect">
             <a:avLst/>
@@ -8100,6 +8101,7 @@
                 </a:solidFill>
                 <a:uFillTx/>
                 <a:latin typeface="Arial"/>
+                <a:ea typeface="DejaVu Sans"/>
                 <a:hlinkClick r:id="rId2"/>
               </a:rPr>
               <a:t>https://github.com/PavelKanazirev/MyDev.Bg/tree/master/source/iMX53/CppPluginSample</a:t>
@@ -8168,7 +8170,7 @@
         <p:spPr>
           <a:xfrm>
             <a:off x="457200" y="274680"/>
-            <a:ext cx="8227080" cy="1140480"/>
+            <a:ext cx="8226720" cy="1140120"/>
           </a:xfrm>
           <a:prstGeom prst="rect">
             <a:avLst/>
@@ -8219,7 +8221,7 @@
         <p:spPr>
           <a:xfrm>
             <a:off x="457200" y="1600200"/>
-            <a:ext cx="8227080" cy="4523400"/>
+            <a:ext cx="8226720" cy="4523040"/>
           </a:xfrm>
           <a:prstGeom prst="rect">
             <a:avLst/>
@@ -8238,7 +8240,7 @@
         <p:txBody>
           <a:bodyPr lIns="90000" rIns="90000" tIns="45000" bIns="45000"/>
           <a:p>
-            <a:pPr marL="514440" indent="-511920">
+            <a:pPr marL="514440" indent="-511560">
               <a:lnSpc>
                 <a:spcPct val="100000"/>
               </a:lnSpc>
@@ -8266,7 +8268,7 @@
             </a:endParaRPr>
           </a:p>
           <a:p>
-            <a:pPr marL="514440" indent="-511920">
+            <a:pPr marL="514440" indent="-511560">
               <a:lnSpc>
                 <a:spcPct val="100000"/>
               </a:lnSpc>
@@ -8294,7 +8296,7 @@
             </a:endParaRPr>
           </a:p>
           <a:p>
-            <a:pPr marL="514440" indent="-511920">
+            <a:pPr marL="514440" indent="-511560">
               <a:lnSpc>
                 <a:spcPct val="100000"/>
               </a:lnSpc>
@@ -8322,7 +8324,7 @@
             </a:endParaRPr>
           </a:p>
           <a:p>
-            <a:pPr marL="514440" indent="-511920">
+            <a:pPr marL="514440" indent="-511560">
               <a:lnSpc>
                 <a:spcPct val="100000"/>
               </a:lnSpc>
@@ -8422,7 +8424,7 @@
         <p:spPr>
           <a:xfrm>
             <a:off x="457200" y="274680"/>
-            <a:ext cx="8227080" cy="1140480"/>
+            <a:ext cx="8226720" cy="1140120"/>
           </a:xfrm>
           <a:prstGeom prst="rect">
             <a:avLst/>
@@ -8477,7 +8479,7 @@
         <p:spPr>
           <a:xfrm>
             <a:off x="2817720" y="1496880"/>
-            <a:ext cx="3479760" cy="5169960"/>
+            <a:ext cx="3479400" cy="5169600"/>
           </a:xfrm>
           <a:prstGeom prst="rect">
             <a:avLst/>
@@ -8545,7 +8547,7 @@
         <p:spPr>
           <a:xfrm>
             <a:off x="457200" y="274680"/>
-            <a:ext cx="8227080" cy="1140480"/>
+            <a:ext cx="8226720" cy="1140120"/>
           </a:xfrm>
           <a:prstGeom prst="rect">
             <a:avLst/>
@@ -8594,7 +8596,7 @@
         <p:spPr>
           <a:xfrm>
             <a:off x="467640" y="1340640"/>
-            <a:ext cx="8227080" cy="5254200"/>
+            <a:ext cx="8226720" cy="5253840"/>
           </a:xfrm>
           <a:prstGeom prst="rect">
             <a:avLst/>
@@ -8615,7 +8617,7 @@
             <a:normAutofit/>
           </a:bodyPr>
           <a:p>
-            <a:pPr marL="514440" indent="-511920">
+            <a:pPr marL="514440" indent="-511560">
               <a:lnSpc>
                 <a:spcPct val="100000"/>
               </a:lnSpc>
@@ -8643,7 +8645,7 @@
             </a:endParaRPr>
           </a:p>
           <a:p>
-            <a:pPr marL="514440" indent="-511920">
+            <a:pPr marL="514440" indent="-511560">
               <a:lnSpc>
                 <a:spcPct val="100000"/>
               </a:lnSpc>
@@ -8671,7 +8673,7 @@
             </a:endParaRPr>
           </a:p>
           <a:p>
-            <a:pPr marL="514440" indent="-511920">
+            <a:pPr marL="514440" indent="-511560">
               <a:lnSpc>
                 <a:spcPct val="100000"/>
               </a:lnSpc>
@@ -8699,7 +8701,7 @@
             </a:endParaRPr>
           </a:p>
           <a:p>
-            <a:pPr marL="514440" indent="-511920">
+            <a:pPr marL="514440" indent="-511560">
               <a:lnSpc>
                 <a:spcPct val="100000"/>
               </a:lnSpc>
@@ -8727,7 +8729,7 @@
             </a:endParaRPr>
           </a:p>
           <a:p>
-            <a:pPr marL="514440" indent="-511920">
+            <a:pPr marL="514440" indent="-511560">
               <a:lnSpc>
                 <a:spcPct val="100000"/>
               </a:lnSpc>
@@ -8814,7 +8816,7 @@
         <p:spPr>
           <a:xfrm>
             <a:off x="0" y="2880"/>
-            <a:ext cx="9141480" cy="1335240"/>
+            <a:ext cx="9141120" cy="1334880"/>
           </a:xfrm>
           <a:prstGeom prst="rect">
             <a:avLst/>
@@ -8865,7 +8867,7 @@
         <p:spPr>
           <a:xfrm>
             <a:off x="0" y="1377000"/>
-            <a:ext cx="9141480" cy="3653640"/>
+            <a:ext cx="9141120" cy="3653280"/>
           </a:xfrm>
           <a:prstGeom prst="rect">
             <a:avLst/>
@@ -8897,7 +8899,7 @@
                 <a:latin typeface="Calibri"/>
                 <a:ea typeface="DejaVu Sans"/>
               </a:rPr>
-              <a:t>Комбинация от хардуер и софтуер, създадена за да изпълнява конкретна функция или спицифични функции като част от по-голяма система.</a:t>
+              <a:t>Комбинация от хардуер и софтуер, създадена за да изпълнява конкретна функция или специфични функции като част от по-голяма система.</a:t>
             </a:r>
             <a:endParaRPr b="0" lang="en-US" sz="2400" spc="-1" strike="noStrike">
               <a:latin typeface="Arial"/>
@@ -9033,7 +9035,7 @@
         <p:spPr>
           <a:xfrm>
             <a:off x="457200" y="1600200"/>
-            <a:ext cx="8227080" cy="4523400"/>
+            <a:ext cx="8226720" cy="4523040"/>
           </a:xfrm>
           <a:prstGeom prst="rect">
             <a:avLst/>
@@ -9052,7 +9054,7 @@
         <p:txBody>
           <a:bodyPr lIns="90000" rIns="90000" tIns="45000" bIns="45000"/>
           <a:p>
-            <a:pPr marL="343080" indent="-340560">
+            <a:pPr marL="343080" indent="-340200">
               <a:lnSpc>
                 <a:spcPct val="100000"/>
               </a:lnSpc>
@@ -9090,7 +9092,7 @@
         <p:spPr>
           <a:xfrm>
             <a:off x="457200" y="274680"/>
-            <a:ext cx="8227080" cy="1140480"/>
+            <a:ext cx="8226720" cy="1140120"/>
           </a:xfrm>
           <a:prstGeom prst="rect">
             <a:avLst/>
@@ -9139,7 +9141,7 @@
         <p:spPr>
           <a:xfrm>
             <a:off x="0" y="6219720"/>
-            <a:ext cx="8326440" cy="636840"/>
+            <a:ext cx="8326080" cy="636480"/>
           </a:xfrm>
           <a:prstGeom prst="rect">
             <a:avLst/>
@@ -9169,7 +9171,7 @@
         <p:spPr>
           <a:xfrm>
             <a:off x="91440" y="2286000"/>
-            <a:ext cx="8903880" cy="4021920"/>
+            <a:ext cx="8903520" cy="4021560"/>
           </a:xfrm>
           <a:prstGeom prst="rect">
             <a:avLst/>
@@ -9237,7 +9239,7 @@
         <p:spPr>
           <a:xfrm>
             <a:off x="458280" y="91440"/>
-            <a:ext cx="8227080" cy="1140480"/>
+            <a:ext cx="8226720" cy="1140120"/>
           </a:xfrm>
           <a:prstGeom prst="rect">
             <a:avLst/>
@@ -9286,7 +9288,7 @@
         <p:spPr>
           <a:xfrm>
             <a:off x="0" y="6219720"/>
-            <a:ext cx="8326440" cy="636840"/>
+            <a:ext cx="8326080" cy="636480"/>
           </a:xfrm>
           <a:prstGeom prst="rect">
             <a:avLst/>
@@ -9316,7 +9318,7 @@
         <p:spPr>
           <a:xfrm>
             <a:off x="2162880" y="920160"/>
-            <a:ext cx="4532400" cy="2069280"/>
+            <a:ext cx="4532040" cy="2068920"/>
           </a:xfrm>
           <a:prstGeom prst="rect">
             <a:avLst/>
@@ -9339,7 +9341,7 @@
         <p:spPr>
           <a:xfrm>
             <a:off x="182520" y="2928960"/>
-            <a:ext cx="8411400" cy="3531600"/>
+            <a:ext cx="8411040" cy="3531240"/>
           </a:xfrm>
           <a:prstGeom prst="rect">
             <a:avLst/>
@@ -9358,7 +9360,7 @@
         <p:spPr>
           <a:xfrm>
             <a:off x="7560" y="6583680"/>
-            <a:ext cx="12793680" cy="366480"/>
+            <a:ext cx="12793320" cy="366120"/>
           </a:xfrm>
           <a:prstGeom prst="rect">
             <a:avLst/>
@@ -9389,6 +9391,7 @@
                 </a:solidFill>
                 <a:uFillTx/>
                 <a:latin typeface="Arial"/>
+                <a:ea typeface="DejaVu Sans"/>
                 <a:hlinkClick r:id="rId3"/>
               </a:rPr>
               <a:t>https://github.com/PavelKanazirev/MyDev.Bg/blob/master/source/TM4C123G/HelloCpp/UartAdapter.h</a:t>
@@ -9457,7 +9460,7 @@
         <p:spPr>
           <a:xfrm>
             <a:off x="457200" y="1327320"/>
-            <a:ext cx="8227080" cy="682920"/>
+            <a:ext cx="8226720" cy="682560"/>
           </a:xfrm>
           <a:prstGeom prst="rect">
             <a:avLst/>
@@ -9476,7 +9479,7 @@
         <p:txBody>
           <a:bodyPr lIns="90000" rIns="90000" tIns="45000" bIns="45000"/>
           <a:p>
-            <a:pPr marL="343080" indent="-340560">
+            <a:pPr marL="343080" indent="-340200">
               <a:lnSpc>
                 <a:spcPct val="100000"/>
               </a:lnSpc>
@@ -9514,7 +9517,7 @@
         <p:spPr>
           <a:xfrm>
             <a:off x="457200" y="274680"/>
-            <a:ext cx="8227080" cy="1140480"/>
+            <a:ext cx="8226720" cy="1140120"/>
           </a:xfrm>
           <a:prstGeom prst="rect">
             <a:avLst/>
@@ -9567,7 +9570,7 @@
         <p:spPr>
           <a:xfrm>
             <a:off x="731520" y="2103120"/>
-            <a:ext cx="6751080" cy="3727440"/>
+            <a:ext cx="6750720" cy="3727080"/>
           </a:xfrm>
           <a:prstGeom prst="rect">
             <a:avLst/>
@@ -9586,7 +9589,7 @@
         <p:spPr>
           <a:xfrm>
             <a:off x="0" y="6492240"/>
-            <a:ext cx="8686440" cy="366480"/>
+            <a:ext cx="8686080" cy="366120"/>
           </a:xfrm>
           <a:prstGeom prst="rect">
             <a:avLst/>
@@ -9617,6 +9620,7 @@
                 </a:solidFill>
                 <a:uFillTx/>
                 <a:latin typeface="Arial"/>
+                <a:ea typeface="DejaVu Sans"/>
                 <a:hlinkClick r:id="rId2"/>
               </a:rPr>
               <a:t>https://github.com/PavelKanazirev/MyDev.Bg/blob/master/source/iMX53/CPPvsC_examples/SampleCSPI.c</a:t>
@@ -9685,7 +9689,7 @@
         <p:spPr>
           <a:xfrm>
             <a:off x="457200" y="274680"/>
-            <a:ext cx="8227080" cy="1140480"/>
+            <a:ext cx="8226720" cy="1140120"/>
           </a:xfrm>
           <a:prstGeom prst="rect">
             <a:avLst/>
@@ -9738,7 +9742,7 @@
         <p:spPr>
           <a:xfrm>
             <a:off x="1005840" y="1188720"/>
-            <a:ext cx="6894360" cy="3151440"/>
+            <a:ext cx="6894000" cy="3151080"/>
           </a:xfrm>
           <a:prstGeom prst="rect">
             <a:avLst/>
@@ -9761,7 +9765,7 @@
         <p:spPr>
           <a:xfrm>
             <a:off x="207360" y="4297680"/>
-            <a:ext cx="8569440" cy="1066320"/>
+            <a:ext cx="8569080" cy="1065960"/>
           </a:xfrm>
           <a:prstGeom prst="rect">
             <a:avLst/>
@@ -9780,7 +9784,7 @@
         <p:spPr>
           <a:xfrm>
             <a:off x="457200" y="5669280"/>
-            <a:ext cx="8045280" cy="662040"/>
+            <a:ext cx="8044920" cy="661680"/>
           </a:xfrm>
           <a:prstGeom prst="rect">
             <a:avLst/>
@@ -9908,7 +9912,7 @@
         <p:spPr>
           <a:xfrm>
             <a:off x="457200" y="-13320"/>
-            <a:ext cx="8227080" cy="912600"/>
+            <a:ext cx="8226720" cy="912240"/>
           </a:xfrm>
           <a:prstGeom prst="rect">
             <a:avLst/>
@@ -9961,7 +9965,7 @@
         <p:spPr>
           <a:xfrm>
             <a:off x="365760" y="809280"/>
-            <a:ext cx="8136720" cy="3830760"/>
+            <a:ext cx="8136360" cy="3830400"/>
           </a:xfrm>
           <a:prstGeom prst="rect">
             <a:avLst/>
@@ -9984,7 +9988,7 @@
         <p:spPr>
           <a:xfrm>
             <a:off x="346320" y="4702320"/>
-            <a:ext cx="8136720" cy="1787760"/>
+            <a:ext cx="8136360" cy="1787400"/>
           </a:xfrm>
           <a:prstGeom prst="rect">
             <a:avLst/>
@@ -10003,7 +10007,7 @@
         <p:spPr>
           <a:xfrm>
             <a:off x="0" y="6583680"/>
-            <a:ext cx="8960760" cy="366480"/>
+            <a:ext cx="8960400" cy="366120"/>
           </a:xfrm>
           <a:prstGeom prst="rect">
             <a:avLst/>
@@ -10034,6 +10038,7 @@
                 </a:solidFill>
                 <a:uFillTx/>
                 <a:latin typeface="Arial"/>
+                <a:ea typeface="DejaVu Sans"/>
                 <a:hlinkClick r:id="rId3"/>
               </a:rPr>
               <a:t>https://github.com/PavelKanazirev/MyDev.Bg/blob/master/source/iMX53/CPPvsC_examples/SampleCppSPI.h</a:t>
@@ -10102,7 +10107,7 @@
         <p:spPr>
           <a:xfrm>
             <a:off x="457200" y="274680"/>
-            <a:ext cx="8227080" cy="1140480"/>
+            <a:ext cx="8226720" cy="1140120"/>
           </a:xfrm>
           <a:prstGeom prst="rect">
             <a:avLst/>
@@ -10151,7 +10156,7 @@
         <p:spPr>
           <a:xfrm>
             <a:off x="457200" y="1600200"/>
-            <a:ext cx="8227080" cy="4523400"/>
+            <a:ext cx="8226720" cy="4523040"/>
           </a:xfrm>
           <a:prstGeom prst="rect">
             <a:avLst/>
@@ -10170,7 +10175,7 @@
         <p:txBody>
           <a:bodyPr lIns="90000" rIns="90000" tIns="45000" bIns="45000"/>
           <a:p>
-            <a:pPr marL="343080" indent="-340560">
+            <a:pPr marL="343080" indent="-340200">
               <a:lnSpc>
                 <a:spcPct val="100000"/>
               </a:lnSpc>
@@ -10212,7 +10217,7 @@
         <p:spPr>
           <a:xfrm>
             <a:off x="918000" y="2226960"/>
-            <a:ext cx="6941880" cy="2474640"/>
+            <a:ext cx="6941520" cy="2474280"/>
           </a:xfrm>
           <a:prstGeom prst="rect">
             <a:avLst/>
@@ -10231,7 +10236,7 @@
         <p:spPr>
           <a:xfrm>
             <a:off x="0" y="6492240"/>
-            <a:ext cx="8595000" cy="366480"/>
+            <a:ext cx="8594640" cy="366120"/>
           </a:xfrm>
           <a:prstGeom prst="rect">
             <a:avLst/>
@@ -10262,6 +10267,7 @@
                 </a:solidFill>
                 <a:uFillTx/>
                 <a:latin typeface="Arial"/>
+                <a:ea typeface="DejaVu Sans"/>
                 <a:hlinkClick r:id="rId2"/>
               </a:rPr>
               <a:t>https://github.com/PavelKanazirev/MyDev.Bg/blob/master/source/iMX53/CppModTest/src/FunctorTest.cpp</a:t>
@@ -10330,7 +10336,7 @@
         <p:spPr>
           <a:xfrm>
             <a:off x="457200" y="-49320"/>
-            <a:ext cx="8227080" cy="1140480"/>
+            <a:ext cx="8226720" cy="1140120"/>
           </a:xfrm>
           <a:prstGeom prst="rect">
             <a:avLst/>
@@ -10379,7 +10385,7 @@
         <p:spPr>
           <a:xfrm>
             <a:off x="457200" y="1234440"/>
-            <a:ext cx="3839760" cy="867960"/>
+            <a:ext cx="3839400" cy="867600"/>
           </a:xfrm>
           <a:prstGeom prst="rect">
             <a:avLst/>
@@ -10479,7 +10485,7 @@
         <p:spPr>
           <a:xfrm>
             <a:off x="-80640" y="6488640"/>
-            <a:ext cx="1207800" cy="362520"/>
+            <a:ext cx="1207440" cy="362160"/>
           </a:xfrm>
           <a:prstGeom prst="rect">
             <a:avLst/>
@@ -10509,7 +10515,7 @@
         <p:spPr>
           <a:xfrm>
             <a:off x="2651760" y="946440"/>
-            <a:ext cx="6034320" cy="5209920"/>
+            <a:ext cx="6033960" cy="5209560"/>
           </a:xfrm>
           <a:prstGeom prst="rect">
             <a:avLst/>
@@ -10528,7 +10534,7 @@
         <p:spPr>
           <a:xfrm>
             <a:off x="10800" y="6484680"/>
-            <a:ext cx="8949960" cy="366480"/>
+            <a:ext cx="8949600" cy="366120"/>
           </a:xfrm>
           <a:prstGeom prst="rect">
             <a:avLst/>
@@ -10559,6 +10565,7 @@
                 </a:solidFill>
                 <a:uFillTx/>
                 <a:latin typeface="Arial"/>
+                <a:ea typeface="DejaVu Sans"/>
                 <a:hlinkClick r:id="rId2"/>
               </a:rPr>
               <a:t>https://github.com/PavelKanazirev/MyDev.Bg/tree/master/source/TM4C123G/HelloCpp</a:t>
@@ -10627,7 +10634,7 @@
         <p:spPr>
           <a:xfrm>
             <a:off x="459720" y="0"/>
-            <a:ext cx="8227080" cy="1005840"/>
+            <a:ext cx="8226720" cy="1005480"/>
           </a:xfrm>
           <a:prstGeom prst="rect">
             <a:avLst/>
@@ -10676,7 +10683,7 @@
         <p:spPr>
           <a:xfrm>
             <a:off x="91440" y="783000"/>
-            <a:ext cx="5485680" cy="405720"/>
+            <a:ext cx="5485320" cy="405360"/>
           </a:xfrm>
           <a:prstGeom prst="rect">
             <a:avLst/>
@@ -10695,7 +10702,7 @@
         <p:txBody>
           <a:bodyPr lIns="90000" rIns="90000" tIns="45000" bIns="45000"/>
           <a:p>
-            <a:pPr marL="343080" indent="-340560">
+            <a:pPr marL="343080" indent="-340200">
               <a:lnSpc>
                 <a:spcPct val="100000"/>
               </a:lnSpc>
@@ -10737,7 +10744,7 @@
         <p:spPr>
           <a:xfrm>
             <a:off x="499320" y="1211040"/>
-            <a:ext cx="8278200" cy="5091480"/>
+            <a:ext cx="8277840" cy="5091120"/>
           </a:xfrm>
           <a:prstGeom prst="rect">
             <a:avLst/>
@@ -10749,14 +10756,14 @@
       </p:pic>
       <p:sp>
         <p:nvSpPr>
-          <p:cNvPr id="237" name="TextShape 3"/>
-          <p:cNvSpPr txBox="1"/>
+          <p:cNvPr id="237" name="CustomShape 3"/>
+          <p:cNvSpPr/>
           <p:nvPr/>
         </p:nvSpPr>
         <p:spPr>
           <a:xfrm>
             <a:off x="95760" y="6583680"/>
-            <a:ext cx="7585200" cy="366840"/>
+            <a:ext cx="7584840" cy="366480"/>
           </a:xfrm>
           <a:prstGeom prst="rect">
             <a:avLst/>
@@ -10766,11 +10773,26 @@
             <a:noFill/>
           </a:ln>
         </p:spPr>
+        <p:style>
+          <a:lnRef idx="0"/>
+          <a:fillRef idx="0"/>
+          <a:effectRef idx="0"/>
+          <a:fontRef idx="minor"/>
+        </p:style>
         <p:txBody>
           <a:bodyPr lIns="90000" rIns="90000" tIns="45000" bIns="45000"/>
           <a:p>
-            <a:r>
-              <a:rPr b="0" lang="en-US" sz="1400" spc="-1" strike="noStrike">
+            <a:pPr>
+              <a:lnSpc>
+                <a:spcPct val="100000"/>
+              </a:lnSpc>
+            </a:pPr>
+            <a:r>
+              <a:rPr b="0" lang="en-US" sz="1400" spc="-1" strike="noStrike" u="sng">
+                <a:solidFill>
+                  <a:srgbClr val="0000ff"/>
+                </a:solidFill>
+                <a:uFillTx/>
                 <a:latin typeface="Arial"/>
                 <a:hlinkClick r:id="rId2"/>
               </a:rPr>
@@ -10840,7 +10862,7 @@
         <p:spPr>
           <a:xfrm>
             <a:off x="457200" y="274680"/>
-            <a:ext cx="8227080" cy="1140480"/>
+            <a:ext cx="8226720" cy="1140120"/>
           </a:xfrm>
           <a:prstGeom prst="rect">
             <a:avLst/>
@@ -10893,7 +10915,7 @@
         <p:spPr>
           <a:xfrm>
             <a:off x="320760" y="2377440"/>
-            <a:ext cx="8192520" cy="2650320"/>
+            <a:ext cx="8192160" cy="2649960"/>
           </a:xfrm>
           <a:prstGeom prst="rect">
             <a:avLst/>
@@ -10912,7 +10934,7 @@
         <p:spPr>
           <a:xfrm>
             <a:off x="822960" y="1554480"/>
-            <a:ext cx="7680240" cy="518760"/>
+            <a:ext cx="7679880" cy="518400"/>
           </a:xfrm>
           <a:prstGeom prst="rect">
             <a:avLst/>
@@ -10981,7 +11003,7 @@
         <p:spPr>
           <a:xfrm>
             <a:off x="732240" y="5499720"/>
-            <a:ext cx="3655440" cy="351000"/>
+            <a:ext cx="3655080" cy="350640"/>
           </a:xfrm>
           <a:prstGeom prst="rect">
             <a:avLst/>
@@ -11023,14 +11045,14 @@
       </p:sp>
       <p:sp>
         <p:nvSpPr>
-          <p:cNvPr id="242" name="TextShape 4"/>
-          <p:cNvSpPr txBox="1"/>
+          <p:cNvPr id="242" name="CustomShape 4"/>
+          <p:cNvSpPr/>
           <p:nvPr/>
         </p:nvSpPr>
         <p:spPr>
           <a:xfrm>
             <a:off x="139680" y="5120640"/>
-            <a:ext cx="8821440" cy="366840"/>
+            <a:ext cx="8821080" cy="366480"/>
           </a:xfrm>
           <a:prstGeom prst="rect">
             <a:avLst/>
@@ -11040,11 +11062,26 @@
             <a:noFill/>
           </a:ln>
         </p:spPr>
+        <p:style>
+          <a:lnRef idx="0"/>
+          <a:fillRef idx="0"/>
+          <a:effectRef idx="0"/>
+          <a:fontRef idx="minor"/>
+        </p:style>
         <p:txBody>
           <a:bodyPr lIns="90000" rIns="90000" tIns="45000" bIns="45000"/>
           <a:p>
-            <a:r>
-              <a:rPr b="0" lang="en-US" sz="1400" spc="-1" strike="noStrike">
+            <a:pPr>
+              <a:lnSpc>
+                <a:spcPct val="100000"/>
+              </a:lnSpc>
+            </a:pPr>
+            <a:r>
+              <a:rPr b="0" lang="en-US" sz="1400" spc="-1" strike="noStrike" u="sng">
+                <a:solidFill>
+                  <a:srgbClr val="0000ff"/>
+                </a:solidFill>
+                <a:uFillTx/>
                 <a:latin typeface="Arial"/>
                 <a:hlinkClick r:id="rId2"/>
               </a:rPr>
@@ -11058,14 +11095,14 @@
       </p:sp>
       <p:sp>
         <p:nvSpPr>
-          <p:cNvPr id="243" name="TextShape 5"/>
-          <p:cNvSpPr txBox="1"/>
+          <p:cNvPr id="243" name="CustomShape 5"/>
+          <p:cNvSpPr/>
           <p:nvPr/>
         </p:nvSpPr>
         <p:spPr>
           <a:xfrm>
             <a:off x="-16920" y="6491160"/>
-            <a:ext cx="9435240" cy="366840"/>
+            <a:ext cx="9434880" cy="366480"/>
           </a:xfrm>
           <a:prstGeom prst="rect">
             <a:avLst/>
@@ -11075,11 +11112,26 @@
             <a:noFill/>
           </a:ln>
         </p:spPr>
+        <p:style>
+          <a:lnRef idx="0"/>
+          <a:fillRef idx="0"/>
+          <a:effectRef idx="0"/>
+          <a:fontRef idx="minor"/>
+        </p:style>
         <p:txBody>
           <a:bodyPr lIns="90000" rIns="90000" tIns="45000" bIns="45000"/>
           <a:p>
-            <a:r>
-              <a:rPr b="0" lang="en-US" sz="1300" spc="-1" strike="noStrike">
+            <a:pPr>
+              <a:lnSpc>
+                <a:spcPct val="100000"/>
+              </a:lnSpc>
+            </a:pPr>
+            <a:r>
+              <a:rPr b="0" lang="en-US" sz="1300" spc="-1" strike="noStrike" u="sng">
+                <a:solidFill>
+                  <a:srgbClr val="0000ff"/>
+                </a:solidFill>
+                <a:uFillTx/>
                 <a:latin typeface="Arial"/>
                 <a:hlinkClick r:id="rId3"/>
               </a:rPr>
@@ -11149,7 +11201,7 @@
         <p:spPr>
           <a:xfrm>
             <a:off x="457200" y="274680"/>
-            <a:ext cx="8227080" cy="912600"/>
+            <a:ext cx="8226720" cy="912240"/>
           </a:xfrm>
           <a:prstGeom prst="rect">
             <a:avLst/>
@@ -11198,7 +11250,7 @@
         <p:spPr>
           <a:xfrm>
             <a:off x="182880" y="1051560"/>
-            <a:ext cx="8776800" cy="5256360"/>
+            <a:ext cx="8776440" cy="5256000"/>
           </a:xfrm>
           <a:prstGeom prst="rect">
             <a:avLst/>
@@ -12022,7 +12074,7 @@
         <p:spPr>
           <a:xfrm>
             <a:off x="179640" y="1590840"/>
-            <a:ext cx="8889840" cy="3543480"/>
+            <a:ext cx="8889480" cy="3543120"/>
           </a:xfrm>
           <a:prstGeom prst="rect">
             <a:avLst/>
@@ -12041,7 +12093,7 @@
         <p:spPr>
           <a:xfrm>
             <a:off x="0" y="2880"/>
-            <a:ext cx="9141480" cy="1335240"/>
+            <a:ext cx="9141120" cy="1334880"/>
           </a:xfrm>
           <a:prstGeom prst="rect">
             <a:avLst/>
@@ -12141,7 +12193,7 @@
         <p:spPr>
           <a:xfrm>
             <a:off x="457200" y="274680"/>
-            <a:ext cx="8227080" cy="1140480"/>
+            <a:ext cx="8226720" cy="1140120"/>
           </a:xfrm>
           <a:prstGeom prst="rect">
             <a:avLst/>
@@ -12190,7 +12242,7 @@
         <p:spPr>
           <a:xfrm>
             <a:off x="457200" y="1600200"/>
-            <a:ext cx="8227080" cy="4523400"/>
+            <a:ext cx="8226720" cy="4523040"/>
           </a:xfrm>
           <a:prstGeom prst="rect">
             <a:avLst/>
@@ -12273,14 +12325,14 @@
       </p:sp>
       <p:sp>
         <p:nvSpPr>
-          <p:cNvPr id="248" name="TextShape 3"/>
-          <p:cNvSpPr txBox="1"/>
+          <p:cNvPr id="248" name="CustomShape 3"/>
+          <p:cNvSpPr/>
           <p:nvPr/>
         </p:nvSpPr>
         <p:spPr>
           <a:xfrm>
             <a:off x="274320" y="2284920"/>
-            <a:ext cx="11180160" cy="366840"/>
+            <a:ext cx="11179800" cy="366480"/>
           </a:xfrm>
           <a:prstGeom prst="rect">
             <a:avLst/>
@@ -12290,11 +12342,26 @@
             <a:noFill/>
           </a:ln>
         </p:spPr>
+        <p:style>
+          <a:lnRef idx="0"/>
+          <a:fillRef idx="0"/>
+          <a:effectRef idx="0"/>
+          <a:fontRef idx="minor"/>
+        </p:style>
         <p:txBody>
           <a:bodyPr lIns="90000" rIns="90000" tIns="45000" bIns="45000"/>
           <a:p>
-            <a:r>
-              <a:rPr b="0" lang="en-US" sz="1400" spc="-1" strike="noStrike">
+            <a:pPr>
+              <a:lnSpc>
+                <a:spcPct val="100000"/>
+              </a:lnSpc>
+            </a:pPr>
+            <a:r>
+              <a:rPr b="0" lang="en-US" sz="1400" spc="-1" strike="noStrike" u="sng">
+                <a:solidFill>
+                  <a:srgbClr val="0000ff"/>
+                </a:solidFill>
+                <a:uFillTx/>
                 <a:latin typeface="Arial"/>
                 <a:hlinkClick r:id="rId1"/>
               </a:rPr>
@@ -12308,14 +12375,14 @@
       </p:sp>
       <p:sp>
         <p:nvSpPr>
-          <p:cNvPr id="249" name="TextShape 4"/>
-          <p:cNvSpPr txBox="1"/>
+          <p:cNvPr id="249" name="CustomShape 4"/>
+          <p:cNvSpPr/>
           <p:nvPr/>
         </p:nvSpPr>
         <p:spPr>
           <a:xfrm>
             <a:off x="41040" y="6491160"/>
-            <a:ext cx="7548480" cy="366840"/>
+            <a:ext cx="7548120" cy="366480"/>
           </a:xfrm>
           <a:prstGeom prst="rect">
             <a:avLst/>
@@ -12325,11 +12392,26 @@
             <a:noFill/>
           </a:ln>
         </p:spPr>
+        <p:style>
+          <a:lnRef idx="0"/>
+          <a:fillRef idx="0"/>
+          <a:effectRef idx="0"/>
+          <a:fontRef idx="minor"/>
+        </p:style>
         <p:txBody>
           <a:bodyPr lIns="90000" rIns="90000" tIns="45000" bIns="45000"/>
           <a:p>
-            <a:r>
-              <a:rPr b="0" lang="en-US" sz="1400" spc="-1" strike="noStrike">
+            <a:pPr>
+              <a:lnSpc>
+                <a:spcPct val="100000"/>
+              </a:lnSpc>
+            </a:pPr>
+            <a:r>
+              <a:rPr b="0" lang="en-US" sz="1400" spc="-1" strike="noStrike" u="sng">
+                <a:solidFill>
+                  <a:srgbClr val="0000ff"/>
+                </a:solidFill>
+                <a:uFillTx/>
                 <a:latin typeface="Arial"/>
                 <a:hlinkClick r:id="rId2"/>
               </a:rPr>
@@ -12399,7 +12481,7 @@
         <p:spPr>
           <a:xfrm>
             <a:off x="457200" y="2880"/>
-            <a:ext cx="8227080" cy="831960"/>
+            <a:ext cx="8226720" cy="831600"/>
           </a:xfrm>
           <a:prstGeom prst="rect">
             <a:avLst/>
@@ -12448,7 +12530,7 @@
         <p:spPr>
           <a:xfrm>
             <a:off x="91440" y="1188720"/>
-            <a:ext cx="1644840" cy="913320"/>
+            <a:ext cx="1644480" cy="912960"/>
           </a:xfrm>
           <a:prstGeom prst="rect">
             <a:avLst/>
@@ -12539,7 +12621,7 @@
         <p:spPr>
           <a:xfrm>
             <a:off x="144000" y="4505760"/>
-            <a:ext cx="8633160" cy="1818000"/>
+            <a:ext cx="8632800" cy="1817640"/>
           </a:xfrm>
           <a:prstGeom prst="rect">
             <a:avLst/>
@@ -12562,7 +12644,7 @@
         <p:spPr>
           <a:xfrm>
             <a:off x="1920240" y="763920"/>
-            <a:ext cx="7129080" cy="3725280"/>
+            <a:ext cx="7128720" cy="3724920"/>
           </a:xfrm>
           <a:prstGeom prst="rect">
             <a:avLst/>
@@ -12574,14 +12656,14 @@
       </p:pic>
       <p:sp>
         <p:nvSpPr>
-          <p:cNvPr id="254" name="TextShape 3"/>
-          <p:cNvSpPr txBox="1"/>
+          <p:cNvPr id="254" name="CustomShape 3"/>
+          <p:cNvSpPr/>
           <p:nvPr/>
         </p:nvSpPr>
         <p:spPr>
           <a:xfrm>
             <a:off x="0" y="6491160"/>
-            <a:ext cx="9144000" cy="366840"/>
+            <a:ext cx="9143640" cy="366480"/>
           </a:xfrm>
           <a:prstGeom prst="rect">
             <a:avLst/>
@@ -12591,11 +12673,26 @@
             <a:noFill/>
           </a:ln>
         </p:spPr>
+        <p:style>
+          <a:lnRef idx="0"/>
+          <a:fillRef idx="0"/>
+          <a:effectRef idx="0"/>
+          <a:fontRef idx="minor"/>
+        </p:style>
         <p:txBody>
           <a:bodyPr lIns="90000" rIns="90000" tIns="45000" bIns="45000"/>
           <a:p>
-            <a:r>
-              <a:rPr b="0" lang="en-US" sz="1300" spc="-1" strike="noStrike">
+            <a:pPr>
+              <a:lnSpc>
+                <a:spcPct val="100000"/>
+              </a:lnSpc>
+            </a:pPr>
+            <a:r>
+              <a:rPr b="0" lang="en-US" sz="1300" spc="-1" strike="noStrike" u="sng">
+                <a:solidFill>
+                  <a:srgbClr val="0000ff"/>
+                </a:solidFill>
+                <a:uFillTx/>
                 <a:latin typeface="Arial"/>
                 <a:hlinkClick r:id="rId3"/>
               </a:rPr>
@@ -12665,7 +12762,7 @@
         <p:spPr>
           <a:xfrm>
             <a:off x="457200" y="274680"/>
-            <a:ext cx="8227080" cy="1140480"/>
+            <a:ext cx="8226720" cy="1140120"/>
           </a:xfrm>
           <a:prstGeom prst="rect">
             <a:avLst/>
@@ -12714,7 +12811,7 @@
         <p:spPr>
           <a:xfrm>
             <a:off x="457200" y="1600200"/>
-            <a:ext cx="8227080" cy="4523400"/>
+            <a:ext cx="8226720" cy="4523040"/>
           </a:xfrm>
           <a:prstGeom prst="rect">
             <a:avLst/>
@@ -12784,14 +12881,14 @@
       </p:sp>
       <p:sp>
         <p:nvSpPr>
-          <p:cNvPr id="257" name="TextShape 3"/>
-          <p:cNvSpPr txBox="1"/>
+          <p:cNvPr id="257" name="CustomShape 3"/>
+          <p:cNvSpPr/>
           <p:nvPr/>
         </p:nvSpPr>
         <p:spPr>
           <a:xfrm>
             <a:off x="204120" y="6491160"/>
-            <a:ext cx="7568280" cy="366840"/>
+            <a:ext cx="7567920" cy="366480"/>
           </a:xfrm>
           <a:prstGeom prst="rect">
             <a:avLst/>
@@ -12801,11 +12898,26 @@
             <a:noFill/>
           </a:ln>
         </p:spPr>
+        <p:style>
+          <a:lnRef idx="0"/>
+          <a:fillRef idx="0"/>
+          <a:effectRef idx="0"/>
+          <a:fontRef idx="minor"/>
+        </p:style>
         <p:txBody>
           <a:bodyPr lIns="90000" rIns="90000" tIns="45000" bIns="45000"/>
           <a:p>
-            <a:r>
-              <a:rPr b="0" lang="en-US" sz="1400" spc="-1" strike="noStrike">
+            <a:pPr>
+              <a:lnSpc>
+                <a:spcPct val="100000"/>
+              </a:lnSpc>
+            </a:pPr>
+            <a:r>
+              <a:rPr b="0" lang="en-US" sz="1400" spc="-1" strike="noStrike" u="sng">
+                <a:solidFill>
+                  <a:srgbClr val="0000ff"/>
+                </a:solidFill>
+                <a:uFillTx/>
                 <a:latin typeface="Arial"/>
                 <a:hlinkClick r:id="rId1"/>
               </a:rPr>
@@ -12875,7 +12987,7 @@
         <p:spPr>
           <a:xfrm>
             <a:off x="457200" y="274680"/>
-            <a:ext cx="8227080" cy="1140480"/>
+            <a:ext cx="8226720" cy="1140120"/>
           </a:xfrm>
           <a:prstGeom prst="rect">
             <a:avLst/>
@@ -12928,7 +13040,7 @@
         <p:spPr>
           <a:xfrm>
             <a:off x="182880" y="1292400"/>
-            <a:ext cx="8740440" cy="4831920"/>
+            <a:ext cx="8740080" cy="4831560"/>
           </a:xfrm>
           <a:prstGeom prst="rect">
             <a:avLst/>
@@ -12940,14 +13052,14 @@
       </p:pic>
       <p:sp>
         <p:nvSpPr>
-          <p:cNvPr id="260" name="TextShape 2"/>
-          <p:cNvSpPr txBox="1"/>
+          <p:cNvPr id="260" name="CustomShape 2"/>
+          <p:cNvSpPr/>
           <p:nvPr/>
         </p:nvSpPr>
         <p:spPr>
           <a:xfrm>
             <a:off x="-7560" y="6308280"/>
-            <a:ext cx="8511480" cy="366840"/>
+            <a:ext cx="8511120" cy="366480"/>
           </a:xfrm>
           <a:prstGeom prst="rect">
             <a:avLst/>
@@ -12957,11 +13069,26 @@
             <a:noFill/>
           </a:ln>
         </p:spPr>
+        <p:style>
+          <a:lnRef idx="0"/>
+          <a:fillRef idx="0"/>
+          <a:effectRef idx="0"/>
+          <a:fontRef idx="minor"/>
+        </p:style>
         <p:txBody>
           <a:bodyPr lIns="90000" rIns="90000" tIns="45000" bIns="45000"/>
           <a:p>
-            <a:r>
-              <a:rPr b="0" lang="en-US" sz="1400" spc="-1" strike="noStrike">
+            <a:pPr>
+              <a:lnSpc>
+                <a:spcPct val="100000"/>
+              </a:lnSpc>
+            </a:pPr>
+            <a:r>
+              <a:rPr b="0" lang="en-US" sz="1400" spc="-1" strike="noStrike" u="sng">
+                <a:solidFill>
+                  <a:srgbClr val="0000ff"/>
+                </a:solidFill>
+                <a:uFillTx/>
                 <a:latin typeface="Arial"/>
                 <a:hlinkClick r:id="rId2"/>
               </a:rPr>
@@ -13031,7 +13158,7 @@
         <p:spPr>
           <a:xfrm>
             <a:off x="457200" y="274680"/>
-            <a:ext cx="8227080" cy="1140480"/>
+            <a:ext cx="8226720" cy="1140120"/>
           </a:xfrm>
           <a:prstGeom prst="rect">
             <a:avLst/>
@@ -13084,7 +13211,7 @@
         <p:spPr>
           <a:xfrm>
             <a:off x="827640" y="1316880"/>
-            <a:ext cx="7486200" cy="4989960"/>
+            <a:ext cx="7485840" cy="4989600"/>
           </a:xfrm>
           <a:prstGeom prst="rect">
             <a:avLst/>
@@ -13152,7 +13279,7 @@
         <p:spPr>
           <a:xfrm>
             <a:off x="457200" y="274680"/>
-            <a:ext cx="8227080" cy="1140480"/>
+            <a:ext cx="8226720" cy="1140120"/>
           </a:xfrm>
           <a:prstGeom prst="rect">
             <a:avLst/>
@@ -13203,7 +13330,7 @@
         <p:spPr>
           <a:xfrm>
             <a:off x="457200" y="1600200"/>
-            <a:ext cx="8227080" cy="4523400"/>
+            <a:ext cx="8226720" cy="4523040"/>
           </a:xfrm>
           <a:prstGeom prst="rect">
             <a:avLst/>
@@ -13306,7 +13433,7 @@
         <p:spPr>
           <a:xfrm>
             <a:off x="457200" y="274680"/>
-            <a:ext cx="8227080" cy="1140480"/>
+            <a:ext cx="8226720" cy="1140120"/>
           </a:xfrm>
           <a:prstGeom prst="rect">
             <a:avLst/>
@@ -13357,7 +13484,7 @@
         <p:spPr>
           <a:xfrm>
             <a:off x="457200" y="1600200"/>
-            <a:ext cx="8227080" cy="4523400"/>
+            <a:ext cx="8226720" cy="4523040"/>
           </a:xfrm>
           <a:prstGeom prst="rect">
             <a:avLst/>
@@ -13411,7 +13538,7 @@
         <p:spPr>
           <a:xfrm>
             <a:off x="-102960" y="6488640"/>
-            <a:ext cx="1699920" cy="362520"/>
+            <a:ext cx="1699560" cy="362160"/>
           </a:xfrm>
           <a:prstGeom prst="rect">
             <a:avLst/>
@@ -13464,7 +13591,7 @@
         <p:spPr>
           <a:xfrm>
             <a:off x="1322640" y="2421000"/>
-            <a:ext cx="6845040" cy="3597840"/>
+            <a:ext cx="6844680" cy="3597480"/>
           </a:xfrm>
           <a:prstGeom prst="rect">
             <a:avLst/>
@@ -13532,7 +13659,7 @@
         <p:spPr>
           <a:xfrm>
             <a:off x="457200" y="274680"/>
-            <a:ext cx="8227080" cy="1140480"/>
+            <a:ext cx="8226720" cy="1140120"/>
           </a:xfrm>
           <a:prstGeom prst="rect">
             <a:avLst/>
@@ -13583,7 +13710,7 @@
         <p:spPr>
           <a:xfrm>
             <a:off x="457200" y="1600200"/>
-            <a:ext cx="8227080" cy="4523400"/>
+            <a:ext cx="8226720" cy="4523040"/>
           </a:xfrm>
           <a:prstGeom prst="rect">
             <a:avLst/>
@@ -13627,7 +13754,7 @@
             </a:endParaRPr>
           </a:p>
           <a:p>
-            <a:pPr marL="343080" indent="-340560">
+            <a:pPr marL="343080" indent="-340200">
               <a:lnSpc>
                 <a:spcPct val="100000"/>
               </a:lnSpc>
@@ -13655,7 +13782,7 @@
             </a:endParaRPr>
           </a:p>
           <a:p>
-            <a:pPr marL="343080" indent="-340560">
+            <a:pPr marL="343080" indent="-340200">
               <a:lnSpc>
                 <a:spcPct val="100000"/>
               </a:lnSpc>
@@ -13719,7 +13846,7 @@
         <p:spPr>
           <a:xfrm>
             <a:off x="5040" y="6488640"/>
-            <a:ext cx="2764080" cy="910440"/>
+            <a:ext cx="2763720" cy="910080"/>
           </a:xfrm>
           <a:prstGeom prst="rect">
             <a:avLst/>
@@ -13827,7 +13954,7 @@
         <p:spPr>
           <a:xfrm>
             <a:off x="457200" y="274680"/>
-            <a:ext cx="8227080" cy="1423800"/>
+            <a:ext cx="8226720" cy="1423440"/>
           </a:xfrm>
           <a:prstGeom prst="rect">
             <a:avLst/>
@@ -13878,7 +14005,7 @@
         <p:spPr>
           <a:xfrm>
             <a:off x="181800" y="1463040"/>
-            <a:ext cx="3473640" cy="4752720"/>
+            <a:ext cx="3473280" cy="4752360"/>
           </a:xfrm>
           <a:prstGeom prst="rect">
             <a:avLst/>
@@ -13959,7 +14086,7 @@
         <p:spPr>
           <a:xfrm>
             <a:off x="3840480" y="4480560"/>
-            <a:ext cx="4935600" cy="2132640"/>
+            <a:ext cx="4935240" cy="2132280"/>
           </a:xfrm>
           <a:prstGeom prst="rect">
             <a:avLst/>
@@ -13982,7 +14109,7 @@
         <p:spPr>
           <a:xfrm>
             <a:off x="3291840" y="1371600"/>
-            <a:ext cx="5850000" cy="3124440"/>
+            <a:ext cx="5849640" cy="3124080"/>
           </a:xfrm>
           <a:prstGeom prst="rect">
             <a:avLst/>
@@ -14049,8 +14176,8 @@
         </p:nvSpPr>
         <p:spPr>
           <a:xfrm>
-            <a:off x="3566160" y="3291840"/>
-            <a:ext cx="2265480" cy="517320"/>
+            <a:off x="3200400" y="3017520"/>
+            <a:ext cx="3200400" cy="914400"/>
           </a:xfrm>
           <a:prstGeom prst="rect">
             <a:avLst/>
@@ -14148,7 +14275,7 @@
         <p:spPr>
           <a:xfrm>
             <a:off x="47160" y="1296000"/>
-            <a:ext cx="8566560" cy="4965120"/>
+            <a:ext cx="8566200" cy="4964760"/>
           </a:xfrm>
           <a:prstGeom prst="rect">
             <a:avLst/>
@@ -14187,7 +14314,7 @@
             </a:endParaRPr>
           </a:p>
           <a:p>
-            <a:pPr marL="285840" indent="-283320">
+            <a:pPr marL="285840" indent="-282960">
               <a:lnSpc>
                 <a:spcPct val="100000"/>
               </a:lnSpc>
@@ -14212,7 +14339,7 @@
             </a:endParaRPr>
           </a:p>
           <a:p>
-            <a:pPr marL="285840" indent="-283320">
+            <a:pPr marL="285840" indent="-282960">
               <a:lnSpc>
                 <a:spcPct val="100000"/>
               </a:lnSpc>
@@ -14237,7 +14364,7 @@
             </a:endParaRPr>
           </a:p>
           <a:p>
-            <a:pPr marL="285840" indent="-283320">
+            <a:pPr marL="285840" indent="-282960">
               <a:lnSpc>
                 <a:spcPct val="100000"/>
               </a:lnSpc>
@@ -14262,7 +14389,7 @@
             </a:endParaRPr>
           </a:p>
           <a:p>
-            <a:pPr marL="285840" indent="-283320">
+            <a:pPr marL="285840" indent="-282960">
               <a:lnSpc>
                 <a:spcPct val="100000"/>
               </a:lnSpc>
@@ -14287,7 +14414,7 @@
             </a:endParaRPr>
           </a:p>
           <a:p>
-            <a:pPr marL="285840" indent="-283320">
+            <a:pPr marL="285840" indent="-282960">
               <a:lnSpc>
                 <a:spcPct val="100000"/>
               </a:lnSpc>
@@ -14312,7 +14439,7 @@
             </a:endParaRPr>
           </a:p>
           <a:p>
-            <a:pPr marL="285840" indent="-283320">
+            <a:pPr marL="285840" indent="-282960">
               <a:lnSpc>
                 <a:spcPct val="100000"/>
               </a:lnSpc>
@@ -14357,7 +14484,7 @@
         <p:spPr>
           <a:xfrm>
             <a:off x="0" y="2880"/>
-            <a:ext cx="9141480" cy="1335240"/>
+            <a:ext cx="9141120" cy="1334880"/>
           </a:xfrm>
           <a:prstGeom prst="rect">
             <a:avLst/>
@@ -14457,7 +14584,7 @@
         <p:spPr>
           <a:xfrm>
             <a:off x="0" y="2880"/>
-            <a:ext cx="9141480" cy="1335240"/>
+            <a:ext cx="9141120" cy="1334880"/>
           </a:xfrm>
           <a:prstGeom prst="rect">
             <a:avLst/>
@@ -14512,7 +14639,7 @@
         <p:spPr>
           <a:xfrm>
             <a:off x="274320" y="1188720"/>
-            <a:ext cx="8540640" cy="4592160"/>
+            <a:ext cx="8540280" cy="4591800"/>
           </a:xfrm>
           <a:prstGeom prst="rect">
             <a:avLst/>
@@ -14531,7 +14658,7 @@
         <p:spPr>
           <a:xfrm>
             <a:off x="0" y="6600240"/>
-            <a:ext cx="9052200" cy="366480"/>
+            <a:ext cx="9051840" cy="366120"/>
           </a:xfrm>
           <a:prstGeom prst="rect">
             <a:avLst/>
@@ -14562,6 +14689,7 @@
                 </a:solidFill>
                 <a:uFillTx/>
                 <a:latin typeface="Arial"/>
+                <a:ea typeface="DejaVu Sans"/>
                 <a:hlinkClick r:id="rId2"/>
               </a:rPr>
               <a:t>https://github.com/PavelKanazirev/MyDev.Bg/tree/master/source/TM4C123G/HelloCpp</a:t>
@@ -14630,7 +14758,7 @@
         <p:spPr>
           <a:xfrm>
             <a:off x="0" y="2880"/>
-            <a:ext cx="9141480" cy="1185120"/>
+            <a:ext cx="9141120" cy="1184760"/>
           </a:xfrm>
           <a:prstGeom prst="rect">
             <a:avLst/>
@@ -14681,7 +14809,7 @@
         <p:spPr>
           <a:xfrm>
             <a:off x="179640" y="1009800"/>
-            <a:ext cx="8710560" cy="1002240"/>
+            <a:ext cx="8710200" cy="1001880"/>
           </a:xfrm>
           <a:prstGeom prst="rect">
             <a:avLst/>
@@ -14734,7 +14862,7 @@
         <p:spPr>
           <a:xfrm>
             <a:off x="532080" y="2143440"/>
-            <a:ext cx="2391480" cy="1570320"/>
+            <a:ext cx="2391120" cy="1569960"/>
           </a:xfrm>
           <a:prstGeom prst="rect">
             <a:avLst/>
@@ -14757,7 +14885,7 @@
         <p:spPr>
           <a:xfrm>
             <a:off x="3034080" y="2090520"/>
-            <a:ext cx="1731600" cy="1731600"/>
+            <a:ext cx="1731240" cy="1731240"/>
           </a:xfrm>
           <a:prstGeom prst="rect">
             <a:avLst/>
@@ -14780,7 +14908,7 @@
         <p:spPr>
           <a:xfrm>
             <a:off x="4860000" y="1779120"/>
-            <a:ext cx="3597840" cy="3276360"/>
+            <a:ext cx="3597480" cy="3276000"/>
           </a:xfrm>
           <a:prstGeom prst="rect">
             <a:avLst/>
@@ -14803,7 +14931,7 @@
         <p:spPr>
           <a:xfrm>
             <a:off x="5945760" y="5058000"/>
-            <a:ext cx="2855160" cy="1597680"/>
+            <a:ext cx="2854800" cy="1597320"/>
           </a:xfrm>
           <a:prstGeom prst="rect">
             <a:avLst/>
@@ -14826,7 +14954,7 @@
         <p:spPr>
           <a:xfrm>
             <a:off x="638640" y="4213440"/>
-            <a:ext cx="4218840" cy="2483640"/>
+            <a:ext cx="4218480" cy="2483280"/>
           </a:xfrm>
           <a:prstGeom prst="rect">
             <a:avLst/>
@@ -14894,7 +15022,7 @@
         <p:spPr>
           <a:xfrm>
             <a:off x="0" y="2880"/>
-            <a:ext cx="9141480" cy="1185120"/>
+            <a:ext cx="9141120" cy="1184760"/>
           </a:xfrm>
           <a:prstGeom prst="rect">
             <a:avLst/>
@@ -14965,7 +15093,7 @@
         <p:spPr>
           <a:xfrm>
             <a:off x="539640" y="1190520"/>
-            <a:ext cx="8062200" cy="1459800"/>
+            <a:ext cx="8061840" cy="1459440"/>
           </a:xfrm>
           <a:prstGeom prst="rect">
             <a:avLst/>
@@ -15058,7 +15186,7 @@
         <p:spPr>
           <a:xfrm>
             <a:off x="1188720" y="2767320"/>
-            <a:ext cx="6672960" cy="3672000"/>
+            <a:ext cx="6672600" cy="3671640"/>
           </a:xfrm>
           <a:prstGeom prst="rect">
             <a:avLst/>
@@ -15126,7 +15254,7 @@
         <p:spPr>
           <a:xfrm>
             <a:off x="0" y="2880"/>
-            <a:ext cx="9141480" cy="1185120"/>
+            <a:ext cx="9141120" cy="1184760"/>
           </a:xfrm>
           <a:prstGeom prst="rect">
             <a:avLst/>
@@ -15201,7 +15329,7 @@
         <p:spPr>
           <a:xfrm>
             <a:off x="327960" y="1260000"/>
-            <a:ext cx="3967560" cy="5291280"/>
+            <a:ext cx="3967200" cy="5290920"/>
           </a:xfrm>
           <a:prstGeom prst="rect">
             <a:avLst/>
@@ -15224,7 +15352,7 @@
         <p:spPr>
           <a:xfrm>
             <a:off x="4663440" y="1190160"/>
-            <a:ext cx="4021200" cy="3123000"/>
+            <a:ext cx="4020840" cy="3122640"/>
           </a:xfrm>
           <a:prstGeom prst="rect">
             <a:avLst/>
@@ -15247,7 +15375,7 @@
         <p:spPr>
           <a:xfrm>
             <a:off x="4572000" y="4333680"/>
-            <a:ext cx="2100960" cy="2319120"/>
+            <a:ext cx="2100600" cy="2318760"/>
           </a:xfrm>
           <a:prstGeom prst="rect">
             <a:avLst/>
@@ -15270,7 +15398,7 @@
         <p:spPr>
           <a:xfrm>
             <a:off x="6684840" y="4391280"/>
-            <a:ext cx="2274120" cy="2007360"/>
+            <a:ext cx="2273760" cy="2007000"/>
           </a:xfrm>
           <a:prstGeom prst="rect">
             <a:avLst/>
@@ -15338,7 +15466,7 @@
         <p:spPr>
           <a:xfrm>
             <a:off x="0" y="2880"/>
-            <a:ext cx="9141480" cy="1185120"/>
+            <a:ext cx="9141120" cy="1184760"/>
           </a:xfrm>
           <a:prstGeom prst="rect">
             <a:avLst/>
@@ -15409,7 +15537,7 @@
         <p:spPr>
           <a:xfrm>
             <a:off x="179640" y="1155960"/>
-            <a:ext cx="8782560" cy="5573880"/>
+            <a:ext cx="8782200" cy="5573520"/>
           </a:xfrm>
           <a:prstGeom prst="rect">
             <a:avLst/>
@@ -15461,7 +15589,7 @@
                 <a:latin typeface="Calibri"/>
                 <a:ea typeface="DejaVu Sans"/>
               </a:rPr>
-              <a:t>Сигурност – Риск за хората или природата</a:t>
+              <a:t>Сигурност – риск за хората или природата</a:t>
             </a:r>
             <a:endParaRPr b="0" lang="en-US" sz="1800" spc="-1" strike="noStrike">
               <a:latin typeface="Arial"/>

</xml_diff>